<commit_message>
addition of lessons learned section to powerpiont
</commit_message>
<xml_diff>
--- a/docs/CS341-Final-Poster-Jaywing.pptx
+++ b/docs/CS341-Final-Poster-Jaywing.pptx
@@ -253,7 +253,7 @@
             <a:fld id="{5A0289FA-5C8D-47D8-9AF4-5913895D4286}" type="datetimeFigureOut">
               <a:rPr lang="en-US" smtClean="0"/>
               <a:pPr/>
-              <a:t>12/11/2024</a:t>
+              <a:t>12/12/2024</a:t>
             </a:fld>
             <a:endParaRPr lang="en-US"/>
           </a:p>
@@ -884,7 +884,7 @@
               <a:pPr>
                 <a:defRPr/>
               </a:pPr>
-              <a:t>12/11/2024</a:t>
+              <a:t>12/12/2024</a:t>
             </a:fld>
             <a:endParaRPr lang="en-US"/>
           </a:p>
@@ -1074,7 +1074,7 @@
               <a:pPr>
                 <a:defRPr/>
               </a:pPr>
-              <a:t>12/11/2024</a:t>
+              <a:t>12/12/2024</a:t>
             </a:fld>
             <a:endParaRPr lang="en-US"/>
           </a:p>
@@ -1274,7 +1274,7 @@
               <a:pPr>
                 <a:defRPr/>
               </a:pPr>
-              <a:t>12/11/2024</a:t>
+              <a:t>12/12/2024</a:t>
             </a:fld>
             <a:endParaRPr lang="en-US"/>
           </a:p>
@@ -1464,7 +1464,7 @@
               <a:pPr>
                 <a:defRPr/>
               </a:pPr>
-              <a:t>12/11/2024</a:t>
+              <a:t>12/12/2024</a:t>
             </a:fld>
             <a:endParaRPr lang="en-US"/>
           </a:p>
@@ -1731,7 +1731,7 @@
               <a:pPr>
                 <a:defRPr/>
               </a:pPr>
-              <a:t>12/11/2024</a:t>
+              <a:t>12/12/2024</a:t>
             </a:fld>
             <a:endParaRPr lang="en-US"/>
           </a:p>
@@ -2038,7 +2038,7 @@
               <a:pPr>
                 <a:defRPr/>
               </a:pPr>
-              <a:t>12/11/2024</a:t>
+              <a:t>12/12/2024</a:t>
             </a:fld>
             <a:endParaRPr lang="en-US"/>
           </a:p>
@@ -2484,7 +2484,7 @@
               <a:pPr>
                 <a:defRPr/>
               </a:pPr>
-              <a:t>12/11/2024</a:t>
+              <a:t>12/12/2024</a:t>
             </a:fld>
             <a:endParaRPr lang="en-US"/>
           </a:p>
@@ -2623,7 +2623,7 @@
               <a:pPr>
                 <a:defRPr/>
               </a:pPr>
-              <a:t>12/11/2024</a:t>
+              <a:t>12/12/2024</a:t>
             </a:fld>
             <a:endParaRPr lang="en-US"/>
           </a:p>
@@ -2740,7 +2740,7 @@
               <a:pPr>
                 <a:defRPr/>
               </a:pPr>
-              <a:t>12/11/2024</a:t>
+              <a:t>12/12/2024</a:t>
             </a:fld>
             <a:endParaRPr lang="en-US"/>
           </a:p>
@@ -3037,7 +3037,7 @@
               <a:pPr>
                 <a:defRPr/>
               </a:pPr>
-              <a:t>12/11/2024</a:t>
+              <a:t>12/12/2024</a:t>
             </a:fld>
             <a:endParaRPr lang="en-US"/>
           </a:p>
@@ -3314,7 +3314,7 @@
               <a:pPr>
                 <a:defRPr/>
               </a:pPr>
-              <a:t>12/11/2024</a:t>
+              <a:t>12/12/2024</a:t>
             </a:fld>
             <a:endParaRPr lang="en-US"/>
           </a:p>
@@ -3569,7 +3569,7 @@
               <a:pPr>
                 <a:defRPr/>
               </a:pPr>
-              <a:t>12/11/2024</a:t>
+              <a:t>12/12/2024</a:t>
             </a:fld>
             <a:endParaRPr lang="en-US"/>
           </a:p>
@@ -5033,8 +5033,8 @@
         </p:nvSpPr>
         <p:spPr bwMode="auto">
           <a:xfrm>
-            <a:off x="616405" y="22449466"/>
-            <a:ext cx="9714626" cy="3000821"/>
+            <a:off x="616405" y="22338225"/>
+            <a:ext cx="9714626" cy="4170372"/>
           </a:xfrm>
           <a:prstGeom prst="rect">
             <a:avLst/>
@@ -5072,30 +5072,17 @@
           </a:p>
           <a:p>
             <a:r>
-              <a:rPr lang="en-US" sz="2400" dirty="0">
+              <a:rPr lang="en-US" sz="2000" dirty="0">
                 <a:solidFill>
-                  <a:schemeClr val="bg1"/>
+                  <a:srgbClr val="000000"/>
                 </a:solidFill>
+                <a:effectLst/>
                 <a:latin typeface="Verdana" panose="020B0604030504040204" pitchFamily="34" charset="0"/>
                 <a:ea typeface="Verdana" panose="020B0604030504040204" pitchFamily="34" charset="0"/>
-                <a:cs typeface="Verdana" panose="020B0604030504040204" pitchFamily="34" charset="0"/>
               </a:rPr>
-              <a:t>Explain what you learned about the software engineering life cycle through this hands-on project developed in Git using Agile practices including a project board with weekly stand-up meetings.</a:t>
-            </a:r>
-          </a:p>
-          <a:p>
-            <a:r>
-              <a:rPr lang="en-US" sz="2400" dirty="0">
-                <a:solidFill>
-                  <a:schemeClr val="bg1"/>
-                </a:solidFill>
-                <a:latin typeface="Verdana" panose="020B0604030504040204" pitchFamily="34" charset="0"/>
-                <a:ea typeface="Verdana" panose="020B0604030504040204" pitchFamily="34" charset="0"/>
-                <a:cs typeface="Verdana" panose="020B0604030504040204" pitchFamily="34" charset="0"/>
-              </a:rPr>
-              <a:t>Or use your traceability matrix and discuss your use cases and test coverage.</a:t>
-            </a:r>
-            <a:endParaRPr lang="en-US" sz="2400" dirty="0">
+              <a:t>Through this project, we gained hands-on experience with essential web development tools like Git for version control, Bootstrap for interactive design, and XAMPP for local simulation. We built a dynamic, interactive interface using HTML, CSS, and JavaScript, while managing web deployment with FTP.  As a team, we navigated challenges such as distributing work across different skill levels and resolving design disagreements with the ERD model. Managing environments between XAMPP and the web server required careful attention to consistency and merging of desired and working features. These experiences improved our technical skills and taught us the value of collaboration and adaptability in development.</a:t>
+            </a:r>
+            <a:endParaRPr lang="en-US" sz="2000" dirty="0">
               <a:solidFill>
                 <a:srgbClr val="0A2240"/>
               </a:solidFill>
@@ -6838,6 +6825,15 @@
 </file>
 
 <file path=customXml/item1.xml><?xml version="1.0" encoding="utf-8"?>
+<?mso-contentType ?>
+<FormTemplates xmlns="http://schemas.microsoft.com/sharepoint/v3/contenttype/forms">
+  <Display>DocumentLibraryForm</Display>
+  <Edit>DocumentLibraryForm</Edit>
+  <New>DocumentLibraryForm</New>
+</FormTemplates>
+</file>
+
+<file path=customXml/item2.xml><?xml version="1.0" encoding="utf-8"?>
 <ct:contentTypeSchema xmlns:ct="http://schemas.microsoft.com/office/2006/metadata/contentType" xmlns:ma="http://schemas.microsoft.com/office/2006/metadata/properties/metaAttributes" ct:_="" ma:_="" ma:contentTypeName="Document" ma:contentTypeID="0x0101008EFA95D5A453204B82B388E0EAEB7722" ma:contentTypeVersion="17" ma:contentTypeDescription="Create a new document." ma:contentTypeScope="" ma:versionID="dda70ad3042d19a9677b7138053d1fa9">
   <xsd:schema xmlns:xsd="http://www.w3.org/2001/XMLSchema" xmlns:xs="http://www.w3.org/2001/XMLSchema" xmlns:p="http://schemas.microsoft.com/office/2006/metadata/properties" xmlns:ns2="fab6ae7d-06c6-440f-bba1-9caa7231207d" xmlns:ns3="c875c36d-ac51-4e84-9442-bee5089cbcea" targetNamespace="http://schemas.microsoft.com/office/2006/metadata/properties" ma:root="true" ma:fieldsID="98010f272a5ba5ef2e8b4481ca434998" ns2:_="" ns3:_="">
     <xsd:import namespace="fab6ae7d-06c6-440f-bba1-9caa7231207d"/>
@@ -7086,15 +7082,6 @@
 </ct:contentTypeSchema>
 </file>
 
-<file path=customXml/item2.xml><?xml version="1.0" encoding="utf-8"?>
-<?mso-contentType ?>
-<FormTemplates xmlns="http://schemas.microsoft.com/sharepoint/v3/contenttype/forms">
-  <Display>DocumentLibraryForm</Display>
-  <Edit>DocumentLibraryForm</Edit>
-  <New>DocumentLibraryForm</New>
-</FormTemplates>
-</file>
-
 <file path=customXml/item3.xml><?xml version="1.0" encoding="utf-8"?>
 <p:properties xmlns:p="http://schemas.microsoft.com/office/2006/metadata/properties" xmlns:xsi="http://www.w3.org/2001/XMLSchema-instance" xmlns:pc="http://schemas.microsoft.com/office/infopath/2007/PartnerControls">
   <documentManagement>
@@ -7115,6 +7102,14 @@
 </file>
 
 <file path=customXml/itemProps1.xml><?xml version="1.0" encoding="utf-8"?>
+<ds:datastoreItem xmlns:ds="http://schemas.openxmlformats.org/officeDocument/2006/customXml" ds:itemID="{EA638ADA-06DF-45AB-BFB2-D0D6F294C0ED}">
+  <ds:schemaRefs>
+    <ds:schemaRef ds:uri="http://schemas.microsoft.com/sharepoint/v3/contenttype/forms"/>
+  </ds:schemaRefs>
+</ds:datastoreItem>
+</file>
+
+<file path=customXml/itemProps2.xml><?xml version="1.0" encoding="utf-8"?>
 <ds:datastoreItem xmlns:ds="http://schemas.openxmlformats.org/officeDocument/2006/customXml" ds:itemID="{32646343-FA08-41DE-B0D1-4C7CF84D7151}">
   <ds:schemaRefs>
     <ds:schemaRef ds:uri="http://schemas.microsoft.com/office/2006/metadata/contentType"/>
@@ -7129,14 +7124,6 @@
     <ds:schemaRef ds:uri="http://purl.org/dc/elements/1.1/"/>
     <ds:schemaRef ds:uri="http://purl.org/dc/terms/"/>
     <ds:schemaRef ds:uri="http://schemas.microsoft.com/internal/obd"/>
-  </ds:schemaRefs>
-</ds:datastoreItem>
-</file>
-
-<file path=customXml/itemProps2.xml><?xml version="1.0" encoding="utf-8"?>
-<ds:datastoreItem xmlns:ds="http://schemas.openxmlformats.org/officeDocument/2006/customXml" ds:itemID="{EA638ADA-06DF-45AB-BFB2-D0D6F294C0ED}">
-  <ds:schemaRefs>
-    <ds:schemaRef ds:uri="http://schemas.microsoft.com/sharepoint/v3/contenttype/forms"/>
   </ds:schemaRefs>
 </ds:datastoreItem>
 </file>

</xml_diff>